<commit_message>
Bug fixes, a little rework here and there
</commit_message>
<xml_diff>
--- a/presentations/master_3.pptx
+++ b/presentations/master_3.pptx
@@ -8924,7 +8924,7 @@
           <a:p>
             <a:fld id="{25109E11-3D4A-497F-8324-A399A7D38560}" type="datetimeFigureOut">
               <a:rPr lang="en-US" smtClean="0"/>
-              <a:t>2/8/2024</a:t>
+              <a:t>6/12/2024</a:t>
             </a:fld>
             <a:endParaRPr lang="en-US"/>
           </a:p>
@@ -9131,7 +9131,7 @@
           <a:p>
             <a:fld id="{25109E11-3D4A-497F-8324-A399A7D38560}" type="datetimeFigureOut">
               <a:rPr lang="en-US" smtClean="0"/>
-              <a:t>2/8/2024</a:t>
+              <a:t>6/12/2024</a:t>
             </a:fld>
             <a:endParaRPr lang="en-US"/>
           </a:p>
@@ -9311,7 +9311,7 @@
           <a:p>
             <a:fld id="{25109E11-3D4A-497F-8324-A399A7D38560}" type="datetimeFigureOut">
               <a:rPr lang="en-US" smtClean="0"/>
-              <a:t>2/8/2024</a:t>
+              <a:t>6/12/2024</a:t>
             </a:fld>
             <a:endParaRPr lang="en-US"/>
           </a:p>
@@ -9516,7 +9516,7 @@
           <a:p>
             <a:fld id="{25109E11-3D4A-497F-8324-A399A7D38560}" type="datetimeFigureOut">
               <a:rPr lang="en-US" smtClean="0"/>
-              <a:t>2/8/2024</a:t>
+              <a:t>6/12/2024</a:t>
             </a:fld>
             <a:endParaRPr lang="en-US"/>
           </a:p>
@@ -18414,7 +18414,7 @@
           <a:p>
             <a:fld id="{25109E11-3D4A-497F-8324-A399A7D38560}" type="datetimeFigureOut">
               <a:rPr lang="en-US" smtClean="0"/>
-              <a:t>2/8/2024</a:t>
+              <a:t>6/12/2024</a:t>
             </a:fld>
             <a:endParaRPr lang="en-US"/>
           </a:p>
@@ -18688,7 +18688,7 @@
           <a:p>
             <a:fld id="{25109E11-3D4A-497F-8324-A399A7D38560}" type="datetimeFigureOut">
               <a:rPr lang="en-US" smtClean="0"/>
-              <a:t>2/8/2024</a:t>
+              <a:t>6/12/2024</a:t>
             </a:fld>
             <a:endParaRPr lang="en-US"/>
           </a:p>
@@ -19086,7 +19086,7 @@
           <a:p>
             <a:fld id="{25109E11-3D4A-497F-8324-A399A7D38560}" type="datetimeFigureOut">
               <a:rPr lang="en-US" smtClean="0"/>
-              <a:t>2/8/2024</a:t>
+              <a:t>6/12/2024</a:t>
             </a:fld>
             <a:endParaRPr lang="en-US"/>
           </a:p>
@@ -19204,7 +19204,7 @@
           <a:p>
             <a:fld id="{25109E11-3D4A-497F-8324-A399A7D38560}" type="datetimeFigureOut">
               <a:rPr lang="en-US" smtClean="0"/>
-              <a:t>2/8/2024</a:t>
+              <a:t>6/12/2024</a:t>
             </a:fld>
             <a:endParaRPr lang="en-US"/>
           </a:p>
@@ -19299,7 +19299,7 @@
           <a:p>
             <a:fld id="{25109E11-3D4A-497F-8324-A399A7D38560}" type="datetimeFigureOut">
               <a:rPr lang="en-US" smtClean="0"/>
-              <a:t>2/8/2024</a:t>
+              <a:t>6/12/2024</a:t>
             </a:fld>
             <a:endParaRPr lang="en-US"/>
           </a:p>
@@ -19589,7 +19589,7 @@
           <a:p>
             <a:fld id="{25109E11-3D4A-497F-8324-A399A7D38560}" type="datetimeFigureOut">
               <a:rPr lang="en-US" smtClean="0"/>
-              <a:t>2/8/2024</a:t>
+              <a:t>6/12/2024</a:t>
             </a:fld>
             <a:endParaRPr lang="en-US"/>
           </a:p>
@@ -19869,7 +19869,7 @@
           <a:p>
             <a:fld id="{25109E11-3D4A-497F-8324-A399A7D38560}" type="datetimeFigureOut">
               <a:rPr lang="en-US" smtClean="0"/>
-              <a:t>2/8/2024</a:t>
+              <a:t>6/12/2024</a:t>
             </a:fld>
             <a:endParaRPr lang="en-US"/>
           </a:p>
@@ -20119,7 +20119,7 @@
           <a:p>
             <a:fld id="{25109E11-3D4A-497F-8324-A399A7D38560}" type="datetimeFigureOut">
               <a:rPr lang="en-US" smtClean="0"/>
-              <a:t>2/8/2024</a:t>
+              <a:t>6/12/2024</a:t>
             </a:fld>
             <a:endParaRPr lang="en-US"/>
           </a:p>
@@ -22306,6 +22306,16 @@
             <a:r>
               <a:rPr lang="en-GB" sz="2000" dirty="0"/>
               <a:t>Solution: 0,0 &gt; 0,1 &gt; 0,2 &gt; 1,2 &gt; 1,1 &gt; 1,0 &gt; 2,0 &gt; 3,0 &gt; 3,1 &gt; 2,1 &gt; 2,2 &gt; 1,2 &gt; 1,1 &gt; 1,0 &gt; 2,0 &gt; 3,0 &gt; 3,1 &gt; 2,1 &gt; 2,2 &gt; 1,2</a:t>
+            </a:r>
+          </a:p>
+          <a:p>
+            <a:pPr lvl="2">
+              <a:buFont typeface="Arial" panose="020B0604020202020204" pitchFamily="34" charset="0"/>
+              <a:buChar char="•"/>
+            </a:pPr>
+            <a:r>
+              <a:rPr lang="en-GB" sz="2000" dirty="0"/>
+              <a:t>Yields “INFO”</a:t>
             </a:r>
           </a:p>
         </p:txBody>

</xml_diff>